<commit_message>
updating docs for use later
</commit_message>
<xml_diff>
--- a/docs/OCC Analysis.pptx
+++ b/docs/OCC Analysis.pptx
@@ -4,6 +4,9 @@
   <p:sldMasterIdLst>
     <p:sldMasterId id="2147483672" r:id="rId4"/>
   </p:sldMasterIdLst>
+  <p:notesMasterIdLst>
+    <p:notesMasterId r:id="rId22"/>
+  </p:notesMasterIdLst>
   <p:sldIdLst>
     <p:sldId id="256" r:id="rId5"/>
     <p:sldId id="257" r:id="rId6"/>
@@ -18,11 +21,10 @@
     <p:sldId id="258" r:id="rId15"/>
     <p:sldId id="263" r:id="rId16"/>
     <p:sldId id="272" r:id="rId17"/>
-    <p:sldId id="266" r:id="rId18"/>
-    <p:sldId id="264" r:id="rId19"/>
-    <p:sldId id="265" r:id="rId20"/>
-    <p:sldId id="273" r:id="rId21"/>
-    <p:sldId id="267" r:id="rId22"/>
+    <p:sldId id="264" r:id="rId18"/>
+    <p:sldId id="265" r:id="rId19"/>
+    <p:sldId id="273" r:id="rId20"/>
+    <p:sldId id="267" r:id="rId21"/>
   </p:sldIdLst>
   <p:sldSz cx="12192000" cy="6858000"/>
   <p:notesSz cx="6858000" cy="9144000"/>
@@ -955,6 +957,472 @@
 </pc:chgInfo>
 </file>
 
+<file path=ppt/notesMasters/notesMaster1.xml><?xml version="1.0" encoding="utf-8"?>
+<p:notesMaster xmlns:a="http://schemas.openxmlformats.org/drawingml/2006/main" xmlns:r="http://schemas.openxmlformats.org/officeDocument/2006/relationships" xmlns:p="http://schemas.openxmlformats.org/presentationml/2006/main">
+  <p:cSld>
+    <p:bg>
+      <p:bgRef idx="1001">
+        <a:schemeClr val="bg1"/>
+      </p:bgRef>
+    </p:bg>
+    <p:spTree>
+      <p:nvGrpSpPr>
+        <p:cNvPr id="1" name=""/>
+        <p:cNvGrpSpPr/>
+        <p:nvPr/>
+      </p:nvGrpSpPr>
+      <p:grpSpPr>
+        <a:xfrm>
+          <a:off x="0" y="0"/>
+          <a:ext cx="0" cy="0"/>
+          <a:chOff x="0" y="0"/>
+          <a:chExt cx="0" cy="0"/>
+        </a:xfrm>
+      </p:grpSpPr>
+      <p:sp>
+        <p:nvSpPr>
+          <p:cNvPr id="2" name="Header Placeholder 1"/>
+          <p:cNvSpPr>
+            <a:spLocks noGrp="1"/>
+          </p:cNvSpPr>
+          <p:nvPr>
+            <p:ph type="hdr" sz="quarter"/>
+          </p:nvPr>
+        </p:nvSpPr>
+        <p:spPr>
+          <a:xfrm>
+            <a:off x="0" y="0"/>
+            <a:ext cx="2971800" cy="458788"/>
+          </a:xfrm>
+          <a:prstGeom prst="rect">
+            <a:avLst/>
+          </a:prstGeom>
+        </p:spPr>
+        <p:txBody>
+          <a:bodyPr vert="horz" lIns="91440" tIns="45720" rIns="91440" bIns="45720" rtlCol="0"/>
+          <a:lstStyle>
+            <a:lvl1pPr algn="l">
+              <a:defRPr sz="1200"/>
+            </a:lvl1pPr>
+          </a:lstStyle>
+          <a:p>
+            <a:endParaRPr lang="en-GB"/>
+          </a:p>
+        </p:txBody>
+      </p:sp>
+      <p:sp>
+        <p:nvSpPr>
+          <p:cNvPr id="3" name="Date Placeholder 2"/>
+          <p:cNvSpPr>
+            <a:spLocks noGrp="1"/>
+          </p:cNvSpPr>
+          <p:nvPr>
+            <p:ph type="dt" idx="1"/>
+          </p:nvPr>
+        </p:nvSpPr>
+        <p:spPr>
+          <a:xfrm>
+            <a:off x="3884613" y="0"/>
+            <a:ext cx="2971800" cy="458788"/>
+          </a:xfrm>
+          <a:prstGeom prst="rect">
+            <a:avLst/>
+          </a:prstGeom>
+        </p:spPr>
+        <p:txBody>
+          <a:bodyPr vert="horz" lIns="91440" tIns="45720" rIns="91440" bIns="45720" rtlCol="0"/>
+          <a:lstStyle>
+            <a:lvl1pPr algn="r">
+              <a:defRPr sz="1200"/>
+            </a:lvl1pPr>
+          </a:lstStyle>
+          <a:p>
+            <a:fld id="{FB53A1AF-AABC-4C0B-9CD6-EA43553B9B99}" type="datetimeFigureOut">
+              <a:rPr lang="en-GB" smtClean="0"/>
+              <a:t>06/03/2025</a:t>
+            </a:fld>
+            <a:endParaRPr lang="en-GB"/>
+          </a:p>
+        </p:txBody>
+      </p:sp>
+      <p:sp>
+        <p:nvSpPr>
+          <p:cNvPr id="4" name="Slide Image Placeholder 3"/>
+          <p:cNvSpPr>
+            <a:spLocks noGrp="1" noRot="1" noChangeAspect="1"/>
+          </p:cNvSpPr>
+          <p:nvPr>
+            <p:ph type="sldImg" idx="2"/>
+          </p:nvPr>
+        </p:nvSpPr>
+        <p:spPr>
+          <a:xfrm>
+            <a:off x="685800" y="1143000"/>
+            <a:ext cx="5486400" cy="3086100"/>
+          </a:xfrm>
+          <a:prstGeom prst="rect">
+            <a:avLst/>
+          </a:prstGeom>
+          <a:noFill/>
+          <a:ln w="12700">
+            <a:solidFill>
+              <a:prstClr val="black"/>
+            </a:solidFill>
+          </a:ln>
+        </p:spPr>
+        <p:txBody>
+          <a:bodyPr vert="horz" lIns="91440" tIns="45720" rIns="91440" bIns="45720" rtlCol="0" anchor="ctr"/>
+          <a:lstStyle/>
+          <a:p>
+            <a:endParaRPr lang="en-GB"/>
+          </a:p>
+        </p:txBody>
+      </p:sp>
+      <p:sp>
+        <p:nvSpPr>
+          <p:cNvPr id="5" name="Notes Placeholder 4"/>
+          <p:cNvSpPr>
+            <a:spLocks noGrp="1"/>
+          </p:cNvSpPr>
+          <p:nvPr>
+            <p:ph type="body" sz="quarter" idx="3"/>
+          </p:nvPr>
+        </p:nvSpPr>
+        <p:spPr>
+          <a:xfrm>
+            <a:off x="685800" y="4400550"/>
+            <a:ext cx="5486400" cy="3600450"/>
+          </a:xfrm>
+          <a:prstGeom prst="rect">
+            <a:avLst/>
+          </a:prstGeom>
+        </p:spPr>
+        <p:txBody>
+          <a:bodyPr vert="horz" lIns="91440" tIns="45720" rIns="91440" bIns="45720" rtlCol="0"/>
+          <a:lstStyle/>
+          <a:p>
+            <a:pPr lvl="0"/>
+            <a:r>
+              <a:rPr lang="en-GB"/>
+              <a:t>Click to edit Master text styles</a:t>
+            </a:r>
+          </a:p>
+          <a:p>
+            <a:pPr lvl="1"/>
+            <a:r>
+              <a:rPr lang="en-GB"/>
+              <a:t>Second level</a:t>
+            </a:r>
+          </a:p>
+          <a:p>
+            <a:pPr lvl="2"/>
+            <a:r>
+              <a:rPr lang="en-GB"/>
+              <a:t>Third level</a:t>
+            </a:r>
+          </a:p>
+          <a:p>
+            <a:pPr lvl="3"/>
+            <a:r>
+              <a:rPr lang="en-GB"/>
+              <a:t>Fourth level</a:t>
+            </a:r>
+          </a:p>
+          <a:p>
+            <a:pPr lvl="4"/>
+            <a:r>
+              <a:rPr lang="en-GB"/>
+              <a:t>Fifth level</a:t>
+            </a:r>
+          </a:p>
+        </p:txBody>
+      </p:sp>
+      <p:sp>
+        <p:nvSpPr>
+          <p:cNvPr id="6" name="Footer Placeholder 5"/>
+          <p:cNvSpPr>
+            <a:spLocks noGrp="1"/>
+          </p:cNvSpPr>
+          <p:nvPr>
+            <p:ph type="ftr" sz="quarter" idx="4"/>
+          </p:nvPr>
+        </p:nvSpPr>
+        <p:spPr>
+          <a:xfrm>
+            <a:off x="0" y="8685213"/>
+            <a:ext cx="2971800" cy="458787"/>
+          </a:xfrm>
+          <a:prstGeom prst="rect">
+            <a:avLst/>
+          </a:prstGeom>
+        </p:spPr>
+        <p:txBody>
+          <a:bodyPr vert="horz" lIns="91440" tIns="45720" rIns="91440" bIns="45720" rtlCol="0" anchor="b"/>
+          <a:lstStyle>
+            <a:lvl1pPr algn="l">
+              <a:defRPr sz="1200"/>
+            </a:lvl1pPr>
+          </a:lstStyle>
+          <a:p>
+            <a:endParaRPr lang="en-GB"/>
+          </a:p>
+        </p:txBody>
+      </p:sp>
+      <p:sp>
+        <p:nvSpPr>
+          <p:cNvPr id="7" name="Slide Number Placeholder 6"/>
+          <p:cNvSpPr>
+            <a:spLocks noGrp="1"/>
+          </p:cNvSpPr>
+          <p:nvPr>
+            <p:ph type="sldNum" sz="quarter" idx="5"/>
+          </p:nvPr>
+        </p:nvSpPr>
+        <p:spPr>
+          <a:xfrm>
+            <a:off x="3884613" y="8685213"/>
+            <a:ext cx="2971800" cy="458787"/>
+          </a:xfrm>
+          <a:prstGeom prst="rect">
+            <a:avLst/>
+          </a:prstGeom>
+        </p:spPr>
+        <p:txBody>
+          <a:bodyPr vert="horz" lIns="91440" tIns="45720" rIns="91440" bIns="45720" rtlCol="0" anchor="b"/>
+          <a:lstStyle>
+            <a:lvl1pPr algn="r">
+              <a:defRPr sz="1200"/>
+            </a:lvl1pPr>
+          </a:lstStyle>
+          <a:p>
+            <a:fld id="{804DC323-70EE-4E3F-89C8-C046D7FCAF49}" type="slidenum">
+              <a:rPr lang="en-GB" smtClean="0"/>
+              <a:t>‹#›</a:t>
+            </a:fld>
+            <a:endParaRPr lang="en-GB"/>
+          </a:p>
+        </p:txBody>
+      </p:sp>
+    </p:spTree>
+    <p:extLst>
+      <p:ext uri="{BB962C8B-B14F-4D97-AF65-F5344CB8AC3E}">
+        <p14:creationId xmlns:p14="http://schemas.microsoft.com/office/powerpoint/2010/main" val="1651532270"/>
+      </p:ext>
+    </p:extLst>
+  </p:cSld>
+  <p:clrMap bg1="lt1" tx1="dk1" bg2="lt2" tx2="dk2" accent1="accent1" accent2="accent2" accent3="accent3" accent4="accent4" accent5="accent5" accent6="accent6" hlink="hlink" folHlink="folHlink"/>
+  <p:notesStyle>
+    <a:lvl1pPr marL="0" algn="l" defTabSz="914400" rtl="0" eaLnBrk="1" latinLnBrk="0" hangingPunct="1">
+      <a:defRPr sz="1200" kern="1200">
+        <a:solidFill>
+          <a:schemeClr val="tx1"/>
+        </a:solidFill>
+        <a:latin typeface="+mn-lt"/>
+        <a:ea typeface="+mn-ea"/>
+        <a:cs typeface="+mn-cs"/>
+      </a:defRPr>
+    </a:lvl1pPr>
+    <a:lvl2pPr marL="457200" algn="l" defTabSz="914400" rtl="0" eaLnBrk="1" latinLnBrk="0" hangingPunct="1">
+      <a:defRPr sz="1200" kern="1200">
+        <a:solidFill>
+          <a:schemeClr val="tx1"/>
+        </a:solidFill>
+        <a:latin typeface="+mn-lt"/>
+        <a:ea typeface="+mn-ea"/>
+        <a:cs typeface="+mn-cs"/>
+      </a:defRPr>
+    </a:lvl2pPr>
+    <a:lvl3pPr marL="914400" algn="l" defTabSz="914400" rtl="0" eaLnBrk="1" latinLnBrk="0" hangingPunct="1">
+      <a:defRPr sz="1200" kern="1200">
+        <a:solidFill>
+          <a:schemeClr val="tx1"/>
+        </a:solidFill>
+        <a:latin typeface="+mn-lt"/>
+        <a:ea typeface="+mn-ea"/>
+        <a:cs typeface="+mn-cs"/>
+      </a:defRPr>
+    </a:lvl3pPr>
+    <a:lvl4pPr marL="1371600" algn="l" defTabSz="914400" rtl="0" eaLnBrk="1" latinLnBrk="0" hangingPunct="1">
+      <a:defRPr sz="1200" kern="1200">
+        <a:solidFill>
+          <a:schemeClr val="tx1"/>
+        </a:solidFill>
+        <a:latin typeface="+mn-lt"/>
+        <a:ea typeface="+mn-ea"/>
+        <a:cs typeface="+mn-cs"/>
+      </a:defRPr>
+    </a:lvl4pPr>
+    <a:lvl5pPr marL="1828800" algn="l" defTabSz="914400" rtl="0" eaLnBrk="1" latinLnBrk="0" hangingPunct="1">
+      <a:defRPr sz="1200" kern="1200">
+        <a:solidFill>
+          <a:schemeClr val="tx1"/>
+        </a:solidFill>
+        <a:latin typeface="+mn-lt"/>
+        <a:ea typeface="+mn-ea"/>
+        <a:cs typeface="+mn-cs"/>
+      </a:defRPr>
+    </a:lvl5pPr>
+    <a:lvl6pPr marL="2286000" algn="l" defTabSz="914400" rtl="0" eaLnBrk="1" latinLnBrk="0" hangingPunct="1">
+      <a:defRPr sz="1200" kern="1200">
+        <a:solidFill>
+          <a:schemeClr val="tx1"/>
+        </a:solidFill>
+        <a:latin typeface="+mn-lt"/>
+        <a:ea typeface="+mn-ea"/>
+        <a:cs typeface="+mn-cs"/>
+      </a:defRPr>
+    </a:lvl6pPr>
+    <a:lvl7pPr marL="2743200" algn="l" defTabSz="914400" rtl="0" eaLnBrk="1" latinLnBrk="0" hangingPunct="1">
+      <a:defRPr sz="1200" kern="1200">
+        <a:solidFill>
+          <a:schemeClr val="tx1"/>
+        </a:solidFill>
+        <a:latin typeface="+mn-lt"/>
+        <a:ea typeface="+mn-ea"/>
+        <a:cs typeface="+mn-cs"/>
+      </a:defRPr>
+    </a:lvl7pPr>
+    <a:lvl8pPr marL="3200400" algn="l" defTabSz="914400" rtl="0" eaLnBrk="1" latinLnBrk="0" hangingPunct="1">
+      <a:defRPr sz="1200" kern="1200">
+        <a:solidFill>
+          <a:schemeClr val="tx1"/>
+        </a:solidFill>
+        <a:latin typeface="+mn-lt"/>
+        <a:ea typeface="+mn-ea"/>
+        <a:cs typeface="+mn-cs"/>
+      </a:defRPr>
+    </a:lvl8pPr>
+    <a:lvl9pPr marL="3657600" algn="l" defTabSz="914400" rtl="0" eaLnBrk="1" latinLnBrk="0" hangingPunct="1">
+      <a:defRPr sz="1200" kern="1200">
+        <a:solidFill>
+          <a:schemeClr val="tx1"/>
+        </a:solidFill>
+        <a:latin typeface="+mn-lt"/>
+        <a:ea typeface="+mn-ea"/>
+        <a:cs typeface="+mn-cs"/>
+      </a:defRPr>
+    </a:lvl9pPr>
+  </p:notesStyle>
+</p:notesMaster>
+</file>
+
+<file path=ppt/notesSlides/notesSlide1.xml><?xml version="1.0" encoding="utf-8"?>
+<p:notes xmlns:a="http://schemas.openxmlformats.org/drawingml/2006/main" xmlns:r="http://schemas.openxmlformats.org/officeDocument/2006/relationships" xmlns:p="http://schemas.openxmlformats.org/presentationml/2006/main">
+  <p:cSld>
+    <p:spTree>
+      <p:nvGrpSpPr>
+        <p:cNvPr id="1" name=""/>
+        <p:cNvGrpSpPr/>
+        <p:nvPr/>
+      </p:nvGrpSpPr>
+      <p:grpSpPr>
+        <a:xfrm>
+          <a:off x="0" y="0"/>
+          <a:ext cx="0" cy="0"/>
+          <a:chOff x="0" y="0"/>
+          <a:chExt cx="0" cy="0"/>
+        </a:xfrm>
+      </p:grpSpPr>
+      <p:sp>
+        <p:nvSpPr>
+          <p:cNvPr id="2" name="Slide Image Placeholder 1"/>
+          <p:cNvSpPr>
+            <a:spLocks noGrp="1" noRot="1" noChangeAspect="1"/>
+          </p:cNvSpPr>
+          <p:nvPr>
+            <p:ph type="sldImg"/>
+          </p:nvPr>
+        </p:nvSpPr>
+        <p:spPr/>
+      </p:sp>
+      <p:sp>
+        <p:nvSpPr>
+          <p:cNvPr id="3" name="Notes Placeholder 2"/>
+          <p:cNvSpPr>
+            <a:spLocks noGrp="1"/>
+          </p:cNvSpPr>
+          <p:nvPr>
+            <p:ph type="body" idx="1"/>
+          </p:nvPr>
+        </p:nvSpPr>
+        <p:spPr/>
+        <p:txBody>
+          <a:bodyPr/>
+          <a:lstStyle/>
+          <a:p>
+            <a:r>
+              <a:rPr lang="en-GB" dirty="0"/>
+              <a:t>Improved Trust Pilot Reviews</a:t>
+            </a:r>
+          </a:p>
+          <a:p>
+            <a:r>
+              <a:rPr lang="en-GB" dirty="0"/>
+              <a:t>Visitor Satisfaction Rate</a:t>
+            </a:r>
+          </a:p>
+          <a:p>
+            <a:r>
+              <a:rPr lang="en-GB" dirty="0"/>
+              <a:t>Number of Repeat Visitors</a:t>
+            </a:r>
+          </a:p>
+          <a:p>
+            <a:r>
+              <a:rPr lang="en-GB" dirty="0"/>
+              <a:t>Page Load Time</a:t>
+            </a:r>
+          </a:p>
+          <a:p>
+            <a:endParaRPr lang="en-GB" dirty="0"/>
+          </a:p>
+          <a:p>
+            <a:r>
+              <a:rPr lang="en-GB" dirty="0"/>
+              <a:t>ALWAYS boils down to increasing profit</a:t>
+            </a:r>
+          </a:p>
+          <a:p>
+            <a:endParaRPr lang="en-GB" dirty="0"/>
+          </a:p>
+        </p:txBody>
+      </p:sp>
+      <p:sp>
+        <p:nvSpPr>
+          <p:cNvPr id="4" name="Slide Number Placeholder 3"/>
+          <p:cNvSpPr>
+            <a:spLocks noGrp="1"/>
+          </p:cNvSpPr>
+          <p:nvPr>
+            <p:ph type="sldNum" sz="quarter" idx="5"/>
+          </p:nvPr>
+        </p:nvSpPr>
+        <p:spPr/>
+        <p:txBody>
+          <a:bodyPr/>
+          <a:lstStyle/>
+          <a:p>
+            <a:fld id="{804DC323-70EE-4E3F-89C8-C046D7FCAF49}" type="slidenum">
+              <a:rPr lang="en-GB" smtClean="0"/>
+              <a:t>15</a:t>
+            </a:fld>
+            <a:endParaRPr lang="en-GB"/>
+          </a:p>
+        </p:txBody>
+      </p:sp>
+    </p:spTree>
+    <p:extLst>
+      <p:ext uri="{BB962C8B-B14F-4D97-AF65-F5344CB8AC3E}">
+        <p14:creationId xmlns:p14="http://schemas.microsoft.com/office/powerpoint/2010/main" val="138892077"/>
+      </p:ext>
+    </p:extLst>
+  </p:cSld>
+  <p:clrMapOvr>
+    <a:masterClrMapping/>
+  </p:clrMapOvr>
+</p:notes>
+</file>
+
 <file path=ppt/slideLayouts/slideLayout1.xml><?xml version="1.0" encoding="utf-8"?>
 <p:sldLayout xmlns:a="http://schemas.openxmlformats.org/drawingml/2006/main" xmlns:r="http://schemas.openxmlformats.org/officeDocument/2006/relationships" xmlns:p="http://schemas.openxmlformats.org/presentationml/2006/main" type="title" preserve="1">
   <p:cSld name="Title Slide">
@@ -1104,7 +1572,7 @@
           <a:p>
             <a:fld id="{C4270120-CDFC-48DE-A6EA-6DEEDD0E436A}" type="datetimeFigureOut">
               <a:rPr lang="en-US" dirty="0"/>
-              <a:t>12/18/2024</a:t>
+              <a:t>3/6/2025</a:t>
             </a:fld>
             <a:endParaRPr lang="en-US" dirty="0"/>
           </a:p>
@@ -1398,7 +1866,7 @@
           <a:p>
             <a:fld id="{2A1F5BA7-0A17-4D30-9B66-E29324151C73}" type="datetimeFigureOut">
               <a:rPr lang="en-US" dirty="0"/>
-              <a:t>12/18/2024</a:t>
+              <a:t>3/6/2025</a:t>
             </a:fld>
             <a:endParaRPr lang="en-US" dirty="0"/>
           </a:p>
@@ -1654,7 +2122,7 @@
           <a:p>
             <a:fld id="{76BEBB1B-D40A-4DB9-B3DE-BAAE675B83CD}" type="datetimeFigureOut">
               <a:rPr lang="en-US" dirty="0"/>
-              <a:t>12/18/2024</a:t>
+              <a:t>3/6/2025</a:t>
             </a:fld>
             <a:endParaRPr lang="en-US" dirty="0"/>
           </a:p>
@@ -1910,7 +2378,7 @@
           <a:p>
             <a:fld id="{A3C9FAAF-C467-4C93-8ECD-39AF5A14D498}" type="datetimeFigureOut">
               <a:rPr lang="en-US" dirty="0"/>
-              <a:t>12/18/2024</a:t>
+              <a:t>3/6/2025</a:t>
             </a:fld>
             <a:endParaRPr lang="en-US" dirty="0"/>
           </a:p>
@@ -2235,7 +2703,7 @@
           <a:p>
             <a:fld id="{3E37E480-B2BA-4553-A144-61E7F75833ED}" type="datetimeFigureOut">
               <a:rPr lang="en-US" dirty="0"/>
-              <a:t>12/18/2024</a:t>
+              <a:t>3/6/2025</a:t>
             </a:fld>
             <a:endParaRPr lang="en-US" dirty="0"/>
           </a:p>
@@ -2589,7 +3057,7 @@
           <a:p>
             <a:fld id="{390E682A-6B53-4B08-AE4D-4C5E659103CC}" type="datetimeFigureOut">
               <a:rPr lang="en-US" dirty="0"/>
-              <a:t>12/18/2024</a:t>
+              <a:t>3/6/2025</a:t>
             </a:fld>
             <a:endParaRPr lang="en-US" dirty="0"/>
           </a:p>
@@ -3105,7 +3573,7 @@
           <a:p>
             <a:fld id="{7C69F0F6-BEBB-4894-ABB2-75C5CBE0DDB9}" type="datetimeFigureOut">
               <a:rPr lang="en-US" dirty="0"/>
-              <a:t>12/18/2024</a:t>
+              <a:t>3/6/2025</a:t>
             </a:fld>
             <a:endParaRPr lang="en-US" dirty="0"/>
           </a:p>
@@ -3421,7 +3889,7 @@
           <a:p>
             <a:fld id="{8B3E9E5F-17D9-4A30-9DA3-64E46A6DF111}" type="datetimeFigureOut">
               <a:rPr lang="en-US" dirty="0"/>
-              <a:t>12/18/2024</a:t>
+              <a:t>3/6/2025</a:t>
             </a:fld>
             <a:endParaRPr lang="en-US" dirty="0"/>
           </a:p>
@@ -3538,7 +4006,7 @@
           <a:p>
             <a:fld id="{033AC5F0-3BC3-4718-BCCA-24B5655EC864}" type="datetimeFigureOut">
               <a:rPr lang="en-US" dirty="0"/>
-              <a:t>12/18/2024</a:t>
+              <a:t>3/6/2025</a:t>
             </a:fld>
             <a:endParaRPr lang="en-US" dirty="0"/>
           </a:p>
@@ -3883,7 +4351,7 @@
           <a:p>
             <a:fld id="{9EB8BD81-465B-40F2-9A54-9DF3B12AF598}" type="datetimeFigureOut">
               <a:rPr lang="en-US" dirty="0"/>
-              <a:t>12/18/2024</a:t>
+              <a:t>3/6/2025</a:t>
             </a:fld>
             <a:endParaRPr lang="en-US" dirty="0"/>
           </a:p>
@@ -4187,7 +4655,7 @@
           <a:p>
             <a:fld id="{F04B3CEF-64EF-4C43-9530-8E9CBFD2CAD1}" type="datetimeFigureOut">
               <a:rPr lang="en-US" dirty="0"/>
-              <a:t>12/18/2024</a:t>
+              <a:t>3/6/2025</a:t>
             </a:fld>
             <a:endParaRPr lang="en-US" dirty="0"/>
           </a:p>
@@ -4430,7 +4898,7 @@
           <a:p>
             <a:fld id="{B70A3DFD-A535-46B2-84C1-61DC8B16A904}" type="datetimeFigureOut">
               <a:rPr lang="en-US" dirty="0"/>
-              <a:t>12/18/2024</a:t>
+              <a:t>3/6/2025</a:t>
             </a:fld>
             <a:endParaRPr lang="en-US" dirty="0"/>
           </a:p>
@@ -5067,7 +5535,7 @@
           <a:lstStyle/>
           <a:p>
             <a:fld id="{2032F9DC-6DC8-4F4B-AFC7-023F03D61B60}" type="datetime1">
-              <a:t>12/18/2024</a:t>
+              <a:t>3/6/2025</a:t>
             </a:fld>
             <a:endParaRPr lang="en-US" dirty="0"/>
           </a:p>
@@ -5290,7 +5758,7 @@
           <a:lstStyle/>
           <a:p>
             <a:fld id="{9B422009-35A3-4ADB-B57E-0FD652C61F35}" type="datetime1">
-              <a:t>12/18/2024</a:t>
+              <a:t>3/6/2025</a:t>
             </a:fld>
             <a:endParaRPr lang="en-US" dirty="0"/>
           </a:p>
@@ -5486,7 +5954,7 @@
           <a:lstStyle/>
           <a:p>
             <a:fld id="{4B1BCB32-DB09-494A-A685-EC24E8BFD6C7}" type="datetime1">
-              <a:t>12/18/2024</a:t>
+              <a:t>3/6/2025</a:t>
             </a:fld>
             <a:endParaRPr lang="en-US" dirty="0"/>
           </a:p>
@@ -5667,7 +6135,7 @@
           <a:lstStyle/>
           <a:p>
             <a:fld id="{4DC2CF6A-7C19-4B63-8F5D-40AA9797A612}" type="datetime1">
-              <a:t>12/18/2024</a:t>
+              <a:t>3/6/2025</a:t>
             </a:fld>
             <a:endParaRPr lang="en-US" dirty="0"/>
           </a:p>
@@ -5766,7 +6234,7 @@
           <p:cNvPr id="2" name="Title 1">
             <a:extLst>
               <a:ext uri="{FF2B5EF4-FFF2-40B4-BE49-F238E27FC236}">
-                <a16:creationId xmlns:a16="http://schemas.microsoft.com/office/drawing/2014/main" id="{CEEC1302-E1DE-AB12-1C06-7B4730C1E5CB}"/>
+                <a16:creationId xmlns:a16="http://schemas.microsoft.com/office/drawing/2014/main" id="{8188461B-0F04-522B-3F97-00BDE9413E49}"/>
               </a:ext>
             </a:extLst>
           </p:cNvPr>
@@ -5783,9 +6251,13 @@
           <a:lstStyle/>
           <a:p>
             <a:r>
-              <a:rPr lang="en-US" dirty="0"/>
-              <a:t>User acceptance criteria</a:t>
-            </a:r>
+              <a:rPr lang="en-US" b="0" dirty="0">
+                <a:ea typeface="+mj-lt"/>
+                <a:cs typeface="+mj-lt"/>
+              </a:rPr>
+              <a:t>functional and non-functional requirements</a:t>
+            </a:r>
+            <a:endParaRPr lang="en-US" dirty="0"/>
           </a:p>
         </p:txBody>
       </p:sp>
@@ -5794,7 +6266,7 @@
           <p:cNvPr id="3" name="Content Placeholder 2">
             <a:extLst>
               <a:ext uri="{FF2B5EF4-FFF2-40B4-BE49-F238E27FC236}">
-                <a16:creationId xmlns:a16="http://schemas.microsoft.com/office/drawing/2014/main" id="{6A9A1971-EE98-FEC0-89DB-74B49EE68741}"/>
+                <a16:creationId xmlns:a16="http://schemas.microsoft.com/office/drawing/2014/main" id="{6A982EE1-3883-3A87-468A-D5611E5A875A}"/>
               </a:ext>
             </a:extLst>
           </p:cNvPr>
@@ -5813,61 +6285,57 @@
           <a:lstStyle/>
           <a:p>
             <a:r>
-              <a:rPr lang="en-US" dirty="0"/>
-              <a:t>This should be a list of things that the users (each of the groups you identified) will need to see / experience / feel </a:t>
-            </a:r>
-            <a:r>
-              <a:rPr lang="en-US" err="1"/>
-              <a:t>etc</a:t>
-            </a:r>
-            <a:r>
               <a:rPr lang="en-US"/>
-              <a:t> To accept the system. </a:t>
+              <a:t>Functional requirements are things the system should do (focus on business needs):</a:t>
             </a:r>
             <a:endParaRPr lang="en-US" dirty="0"/>
           </a:p>
           <a:p>
-            <a:r>
-              <a:rPr lang="en-US" dirty="0"/>
-              <a:t>This could be things like </a:t>
-            </a:r>
-          </a:p>
-          <a:p>
             <a:pPr lvl="1"/>
             <a:r>
               <a:rPr lang="en-US" b="0" dirty="0"/>
-              <a:t> "Clear an obvious navigation bar"</a:t>
+              <a:t>Allow users to register</a:t>
             </a:r>
           </a:p>
           <a:p>
             <a:pPr lvl="1"/>
             <a:r>
-              <a:rPr lang="en-US" b="0"/>
-              <a:t> "Fast loading times for each of the pages"</a:t>
-            </a:r>
+              <a:rPr lang="en-US" b="0" dirty="0"/>
+              <a:t>Once logged in, direct users straight to their profile page</a:t>
+            </a:r>
+          </a:p>
+          <a:p>
+            <a:pPr lvl="1"/>
+            <a:r>
+              <a:rPr lang="en-US" b="0" dirty="0"/>
+              <a:t>Allow booking of events in advance</a:t>
+            </a:r>
+            <a:endParaRPr lang="en-US" dirty="0"/>
+          </a:p>
+          <a:p>
+            <a:r>
+              <a:rPr lang="en-US" dirty="0"/>
+              <a:t>Non-functional requirements are how the system should do things:</a:t>
+            </a:r>
+          </a:p>
+          <a:p>
+            <a:pPr lvl="1"/>
+            <a:r>
+              <a:rPr lang="en-US" b="0" dirty="0"/>
+              <a:t>Store passwords using sha256</a:t>
+            </a:r>
+          </a:p>
+          <a:p>
+            <a:pPr lvl="1"/>
+            <a:r>
+              <a:rPr lang="en-US" b="0" dirty="0"/>
+              <a:t>Each page should load in 2 to 5 seconds</a:t>
+            </a:r>
+          </a:p>
+          <a:p>
+            <a:pPr lvl="1"/>
             <a:endParaRPr lang="en-US" b="0" dirty="0"/>
           </a:p>
-          <a:p>
-            <a:pPr lvl="1"/>
-            <a:r>
-              <a:rPr lang="en-US" b="0" dirty="0"/>
-              <a:t> "Clear instructions on each page for booking"</a:t>
-            </a:r>
-          </a:p>
-          <a:p>
-            <a:pPr lvl="1"/>
-            <a:r>
-              <a:rPr lang="en-US" b="0" dirty="0"/>
-              <a:t> </a:t>
-            </a:r>
-          </a:p>
-          <a:p>
-            <a:pPr lvl="1"/>
-            <a:r>
-              <a:rPr lang="en-US" b="0" dirty="0"/>
-              <a:t>These should be grouped by each of the user groups you have identified</a:t>
-            </a:r>
-          </a:p>
         </p:txBody>
       </p:sp>
       <p:sp>
@@ -5875,7 +6343,7 @@
           <p:cNvPr id="4" name="Date Placeholder 3">
             <a:extLst>
               <a:ext uri="{FF2B5EF4-FFF2-40B4-BE49-F238E27FC236}">
-                <a16:creationId xmlns:a16="http://schemas.microsoft.com/office/drawing/2014/main" id="{DD946777-0DA9-F41C-F7DC-70E975AA73CD}"/>
+                <a16:creationId xmlns:a16="http://schemas.microsoft.com/office/drawing/2014/main" id="{73321FB0-B023-D232-4702-6FD3639023BE}"/>
               </a:ext>
             </a:extLst>
           </p:cNvPr>
@@ -5891,8 +6359,9 @@
           <a:bodyPr/>
           <a:lstStyle/>
           <a:p>
-            <a:fld id="{DBB42D02-3C6F-4292-A35F-A5C817D7BA34}" type="datetime1">
-              <a:t>12/18/2024</a:t>
+            <a:fld id="{CF0E4F07-9D38-4C35-958F-C74211368B57}" type="datetime1">
+              <a:rPr lang="en-US"/>
+              <a:t>3/6/2025</a:t>
             </a:fld>
             <a:endParaRPr lang="en-US" dirty="0"/>
           </a:p>
@@ -5903,7 +6372,7 @@
           <p:cNvPr id="5" name="Footer Placeholder 4">
             <a:extLst>
               <a:ext uri="{FF2B5EF4-FFF2-40B4-BE49-F238E27FC236}">
-                <a16:creationId xmlns:a16="http://schemas.microsoft.com/office/drawing/2014/main" id="{0F753ACE-7FF6-F5AC-162F-947CAAD9883F}"/>
+                <a16:creationId xmlns:a16="http://schemas.microsoft.com/office/drawing/2014/main" id="{9F35D758-EDD2-A28C-B6AA-0B1A13C24EE5}"/>
               </a:ext>
             </a:extLst>
           </p:cNvPr>
@@ -5932,7 +6401,7 @@
           <p:cNvPr id="6" name="Slide Number Placeholder 5">
             <a:extLst>
               <a:ext uri="{FF2B5EF4-FFF2-40B4-BE49-F238E27FC236}">
-                <a16:creationId xmlns:a16="http://schemas.microsoft.com/office/drawing/2014/main" id="{7105DE0A-C9A9-292E-9FA1-E10B7EC2AB64}"/>
+                <a16:creationId xmlns:a16="http://schemas.microsoft.com/office/drawing/2014/main" id="{35A5DBDE-B8CB-3E93-57CD-5A5B7A2FCCB3}"/>
               </a:ext>
             </a:extLst>
           </p:cNvPr>
@@ -5959,7 +6428,7 @@
     </p:spTree>
     <p:extLst>
       <p:ext uri="{BB962C8B-B14F-4D97-AF65-F5344CB8AC3E}">
-        <p14:creationId xmlns:p14="http://schemas.microsoft.com/office/powerpoint/2010/main" val="3894724775"/>
+        <p14:creationId xmlns:p14="http://schemas.microsoft.com/office/powerpoint/2010/main" val="160434339"/>
       </p:ext>
     </p:extLst>
   </p:cSld>
@@ -5991,7 +6460,7 @@
           <p:cNvPr id="2" name="Title 1">
             <a:extLst>
               <a:ext uri="{FF2B5EF4-FFF2-40B4-BE49-F238E27FC236}">
-                <a16:creationId xmlns:a16="http://schemas.microsoft.com/office/drawing/2014/main" id="{8188461B-0F04-522B-3F97-00BDE9413E49}"/>
+                <a16:creationId xmlns:a16="http://schemas.microsoft.com/office/drawing/2014/main" id="{8BF98D75-7C0D-5B46-9724-0B48ED9C62A8}"/>
               </a:ext>
             </a:extLst>
           </p:cNvPr>
@@ -6008,13 +6477,9 @@
           <a:lstStyle/>
           <a:p>
             <a:r>
-              <a:rPr lang="en-US" b="0" dirty="0">
-                <a:ea typeface="+mj-lt"/>
-                <a:cs typeface="+mj-lt"/>
-              </a:rPr>
-              <a:t>functional and non-functional requirements</a:t>
-            </a:r>
-            <a:endParaRPr lang="en-US" dirty="0"/>
+              <a:rPr lang="en-US" dirty="0"/>
+              <a:t>Key Performance Indicators (KPI)</a:t>
+            </a:r>
           </a:p>
         </p:txBody>
       </p:sp>
@@ -6023,7 +6488,7 @@
           <p:cNvPr id="3" name="Content Placeholder 2">
             <a:extLst>
               <a:ext uri="{FF2B5EF4-FFF2-40B4-BE49-F238E27FC236}">
-                <a16:creationId xmlns:a16="http://schemas.microsoft.com/office/drawing/2014/main" id="{6A982EE1-3883-3A87-468A-D5611E5A875A}"/>
+                <a16:creationId xmlns:a16="http://schemas.microsoft.com/office/drawing/2014/main" id="{82981129-CF4E-0784-ED52-788F1A89646B}"/>
               </a:ext>
             </a:extLst>
           </p:cNvPr>
@@ -6042,82 +6507,91 @@
           <a:lstStyle/>
           <a:p>
             <a:r>
+              <a:rPr lang="en-US" dirty="0"/>
+              <a:t>Things that will help to indicate the success of the project from a business perspective:</a:t>
+            </a:r>
+          </a:p>
+          <a:p>
+            <a:r>
+              <a:rPr lang="en-US" dirty="0"/>
+              <a:t>Should be </a:t>
+            </a:r>
+            <a:r>
+              <a:rPr lang="en-US" dirty="0" err="1"/>
+              <a:t>categorised</a:t>
+            </a:r>
+            <a:r>
+              <a:rPr lang="en-US" dirty="0"/>
+              <a:t> where possible. </a:t>
+            </a:r>
+          </a:p>
+          <a:p>
+            <a:r>
+              <a:rPr lang="en-US" dirty="0"/>
+              <a:t>Examples could include:</a:t>
+            </a:r>
+          </a:p>
+          <a:p>
+            <a:pPr lvl="1"/>
+            <a:r>
+              <a:rPr lang="en-US" b="0" dirty="0"/>
+              <a:t>"Improved trust pilot reviews"</a:t>
+            </a:r>
+          </a:p>
+          <a:p>
+            <a:pPr lvl="1"/>
+            <a:r>
+              <a:rPr lang="en-US" b="0" dirty="0"/>
+              <a:t>"visitor satisfaction rate"</a:t>
+            </a:r>
+          </a:p>
+          <a:p>
+            <a:pPr lvl="1"/>
+            <a:r>
+              <a:rPr lang="en-US" b="0" dirty="0"/>
+              <a:t>"Numbers of repeat visitors"</a:t>
+            </a:r>
+          </a:p>
+          <a:p>
+            <a:pPr lvl="1"/>
+            <a:r>
+              <a:rPr lang="en-US" b="0" dirty="0"/>
+              <a:t>"page load time"</a:t>
+            </a:r>
+          </a:p>
+          <a:p>
+            <a:pPr lvl="1"/>
+            <a:r>
+              <a:rPr lang="en-US" b="0" dirty="0"/>
+              <a:t>"traffic by source increase in all sources"</a:t>
+            </a:r>
+          </a:p>
+        </p:txBody>
+      </p:sp>
+      <p:sp>
+        <p:nvSpPr>
+          <p:cNvPr id="4" name="Date Placeholder 3">
+            <a:extLst>
+              <a:ext uri="{FF2B5EF4-FFF2-40B4-BE49-F238E27FC236}">
+                <a16:creationId xmlns:a16="http://schemas.microsoft.com/office/drawing/2014/main" id="{F7CD013A-A7EB-FEA2-9903-F75CC45BA444}"/>
+              </a:ext>
+            </a:extLst>
+          </p:cNvPr>
+          <p:cNvSpPr>
+            <a:spLocks noGrp="1"/>
+          </p:cNvSpPr>
+          <p:nvPr>
+            <p:ph type="dt" sz="half" idx="10"/>
+          </p:nvPr>
+        </p:nvSpPr>
+        <p:spPr/>
+        <p:txBody>
+          <a:bodyPr/>
+          <a:lstStyle/>
+          <a:p>
+            <a:fld id="{1F686CC2-A4A8-4A37-9BE9-F23D3CFE80A3}" type="datetime1">
               <a:rPr lang="en-US"/>
-              <a:t>Functional requirements are things the system should do (focus on business needs):</a:t>
-            </a:r>
-            <a:endParaRPr lang="en-US" dirty="0"/>
-          </a:p>
-          <a:p>
-            <a:pPr lvl="1"/>
-            <a:r>
-              <a:rPr lang="en-US" b="0" dirty="0"/>
-              <a:t>Allow users to register</a:t>
-            </a:r>
-          </a:p>
-          <a:p>
-            <a:pPr lvl="1"/>
-            <a:r>
-              <a:rPr lang="en-US" b="0" dirty="0"/>
-              <a:t>Once logged in, direct users straight to their profile page</a:t>
-            </a:r>
-          </a:p>
-          <a:p>
-            <a:pPr lvl="1"/>
-            <a:r>
-              <a:rPr lang="en-US" b="0" dirty="0"/>
-              <a:t>Allow booking of events in advance</a:t>
-            </a:r>
-            <a:endParaRPr lang="en-US" dirty="0"/>
-          </a:p>
-          <a:p>
-            <a:r>
-              <a:rPr lang="en-US" dirty="0"/>
-              <a:t>Non-functional requirements are how the system should do things:</a:t>
-            </a:r>
-          </a:p>
-          <a:p>
-            <a:pPr lvl="1"/>
-            <a:r>
-              <a:rPr lang="en-US" b="0" dirty="0"/>
-              <a:t>Store passwords using sha256</a:t>
-            </a:r>
-          </a:p>
-          <a:p>
-            <a:pPr lvl="1"/>
-            <a:r>
-              <a:rPr lang="en-US" b="0" dirty="0"/>
-              <a:t>Each page should load in 2 to 5 seconds</a:t>
-            </a:r>
-          </a:p>
-          <a:p>
-            <a:pPr lvl="1"/>
-            <a:endParaRPr lang="en-US" b="0" dirty="0"/>
-          </a:p>
-        </p:txBody>
-      </p:sp>
-      <p:sp>
-        <p:nvSpPr>
-          <p:cNvPr id="4" name="Date Placeholder 3">
-            <a:extLst>
-              <a:ext uri="{FF2B5EF4-FFF2-40B4-BE49-F238E27FC236}">
-                <a16:creationId xmlns:a16="http://schemas.microsoft.com/office/drawing/2014/main" id="{73321FB0-B023-D232-4702-6FD3639023BE}"/>
-              </a:ext>
-            </a:extLst>
-          </p:cNvPr>
-          <p:cNvSpPr>
-            <a:spLocks noGrp="1"/>
-          </p:cNvSpPr>
-          <p:nvPr>
-            <p:ph type="dt" sz="half" idx="10"/>
-          </p:nvPr>
-        </p:nvSpPr>
-        <p:spPr/>
-        <p:txBody>
-          <a:bodyPr/>
-          <a:lstStyle/>
-          <a:p>
-            <a:fld id="{CF0E4F07-9D38-4C35-958F-C74211368B57}" type="datetime1">
-              <a:t>12/18/2024</a:t>
+              <a:t>3/6/2025</a:t>
             </a:fld>
             <a:endParaRPr lang="en-US" dirty="0"/>
           </a:p>
@@ -6128,7 +6602,7 @@
           <p:cNvPr id="5" name="Footer Placeholder 4">
             <a:extLst>
               <a:ext uri="{FF2B5EF4-FFF2-40B4-BE49-F238E27FC236}">
-                <a16:creationId xmlns:a16="http://schemas.microsoft.com/office/drawing/2014/main" id="{9F35D758-EDD2-A28C-B6AA-0B1A13C24EE5}"/>
+                <a16:creationId xmlns:a16="http://schemas.microsoft.com/office/drawing/2014/main" id="{0D5FF411-1893-1FE2-F212-C2D562D1936B}"/>
               </a:ext>
             </a:extLst>
           </p:cNvPr>
@@ -6157,7 +6631,7 @@
           <p:cNvPr id="6" name="Slide Number Placeholder 5">
             <a:extLst>
               <a:ext uri="{FF2B5EF4-FFF2-40B4-BE49-F238E27FC236}">
-                <a16:creationId xmlns:a16="http://schemas.microsoft.com/office/drawing/2014/main" id="{35A5DBDE-B8CB-3E93-57CD-5A5B7A2FCCB3}"/>
+                <a16:creationId xmlns:a16="http://schemas.microsoft.com/office/drawing/2014/main" id="{7906504C-8276-25B6-45D2-1F9EE4F3F44E}"/>
               </a:ext>
             </a:extLst>
           </p:cNvPr>
@@ -6184,7 +6658,7 @@
     </p:spTree>
     <p:extLst>
       <p:ext uri="{BB962C8B-B14F-4D97-AF65-F5344CB8AC3E}">
-        <p14:creationId xmlns:p14="http://schemas.microsoft.com/office/powerpoint/2010/main" val="160434339"/>
+        <p14:creationId xmlns:p14="http://schemas.microsoft.com/office/powerpoint/2010/main" val="2219411030"/>
       </p:ext>
     </p:extLst>
   </p:cSld>
@@ -6216,7 +6690,7 @@
           <p:cNvPr id="2" name="Title 1">
             <a:extLst>
               <a:ext uri="{FF2B5EF4-FFF2-40B4-BE49-F238E27FC236}">
-                <a16:creationId xmlns:a16="http://schemas.microsoft.com/office/drawing/2014/main" id="{8BF98D75-7C0D-5B46-9724-0B48ED9C62A8}"/>
+                <a16:creationId xmlns:a16="http://schemas.microsoft.com/office/drawing/2014/main" id="{803FC071-7465-3F1F-5475-28D9D7F7957F}"/>
               </a:ext>
             </a:extLst>
           </p:cNvPr>
@@ -6234,7 +6708,7 @@
           <a:p>
             <a:r>
               <a:rPr lang="en-US" dirty="0"/>
-              <a:t>Key Performance Indicators (KPI)</a:t>
+              <a:t>Description of proposed solution</a:t>
             </a:r>
           </a:p>
         </p:txBody>
@@ -6244,7 +6718,7 @@
           <p:cNvPr id="3" name="Content Placeholder 2">
             <a:extLst>
               <a:ext uri="{FF2B5EF4-FFF2-40B4-BE49-F238E27FC236}">
-                <a16:creationId xmlns:a16="http://schemas.microsoft.com/office/drawing/2014/main" id="{82981129-CF4E-0784-ED52-788F1A89646B}"/>
+                <a16:creationId xmlns:a16="http://schemas.microsoft.com/office/drawing/2014/main" id="{896A4DE5-CABE-8B5D-527B-10EFA48C8983}"/>
               </a:ext>
             </a:extLst>
           </p:cNvPr>
@@ -6264,63 +6738,11 @@
           <a:p>
             <a:r>
               <a:rPr lang="en-US" dirty="0"/>
-              <a:t>Things that will help to indicate the success of the project from a business perspective:</a:t>
-            </a:r>
-          </a:p>
-          <a:p>
-            <a:r>
-              <a:rPr lang="en-US" dirty="0"/>
-              <a:t>Should be </a:t>
-            </a:r>
-            <a:r>
-              <a:rPr lang="en-US" dirty="0" err="1"/>
-              <a:t>categorised</a:t>
-            </a:r>
-            <a:r>
-              <a:rPr lang="en-US" dirty="0"/>
-              <a:t> where possible. </a:t>
-            </a:r>
-          </a:p>
-          <a:p>
-            <a:r>
-              <a:rPr lang="en-US" dirty="0"/>
-              <a:t>Examples could include:</a:t>
-            </a:r>
-          </a:p>
-          <a:p>
-            <a:pPr lvl="1"/>
-            <a:r>
-              <a:rPr lang="en-US" b="0" dirty="0"/>
-              <a:t>"Improved trust pilot reviews"</a:t>
-            </a:r>
-          </a:p>
-          <a:p>
-            <a:pPr lvl="1"/>
-            <a:r>
-              <a:rPr lang="en-US" b="0" dirty="0"/>
-              <a:t>"visitor satisfaction rate"</a:t>
-            </a:r>
-          </a:p>
-          <a:p>
-            <a:pPr lvl="1"/>
-            <a:r>
-              <a:rPr lang="en-US" b="0" dirty="0"/>
-              <a:t>"Numbers of repeat visitors"</a:t>
-            </a:r>
-          </a:p>
-          <a:p>
-            <a:pPr lvl="1"/>
-            <a:r>
-              <a:rPr lang="en-US" b="0" dirty="0"/>
-              <a:t>"page load time"</a:t>
-            </a:r>
-          </a:p>
-          <a:p>
-            <a:pPr lvl="1"/>
-            <a:r>
-              <a:rPr lang="en-US" b="0" dirty="0"/>
-              <a:t>"traffic by source increase in all sources"</a:t>
-            </a:r>
+              <a:t>Give an overview of what you solution will be</a:t>
+            </a:r>
+          </a:p>
+          <a:p>
+            <a:endParaRPr lang="en-US" dirty="0"/>
           </a:p>
         </p:txBody>
       </p:sp>
@@ -6329,7 +6751,7 @@
           <p:cNvPr id="4" name="Date Placeholder 3">
             <a:extLst>
               <a:ext uri="{FF2B5EF4-FFF2-40B4-BE49-F238E27FC236}">
-                <a16:creationId xmlns:a16="http://schemas.microsoft.com/office/drawing/2014/main" id="{F7CD013A-A7EB-FEA2-9903-F75CC45BA444}"/>
+                <a16:creationId xmlns:a16="http://schemas.microsoft.com/office/drawing/2014/main" id="{49DFB37A-EF32-B985-08FF-60A8C5899542}"/>
               </a:ext>
             </a:extLst>
           </p:cNvPr>
@@ -6345,8 +6767,9 @@
           <a:bodyPr/>
           <a:lstStyle/>
           <a:p>
-            <a:fld id="{1F686CC2-A4A8-4A37-9BE9-F23D3CFE80A3}" type="datetime1">
-              <a:t>12/18/2024</a:t>
+            <a:fld id="{CC16F647-6B65-48C2-BBB4-4C0D6F485AA1}" type="datetime1">
+              <a:rPr lang="en-US"/>
+              <a:t>3/6/2025</a:t>
             </a:fld>
             <a:endParaRPr lang="en-US" dirty="0"/>
           </a:p>
@@ -6357,7 +6780,7 @@
           <p:cNvPr id="5" name="Footer Placeholder 4">
             <a:extLst>
               <a:ext uri="{FF2B5EF4-FFF2-40B4-BE49-F238E27FC236}">
-                <a16:creationId xmlns:a16="http://schemas.microsoft.com/office/drawing/2014/main" id="{0D5FF411-1893-1FE2-F212-C2D562D1936B}"/>
+                <a16:creationId xmlns:a16="http://schemas.microsoft.com/office/drawing/2014/main" id="{A2F86552-D72B-B04C-9F52-6421A6242095}"/>
               </a:ext>
             </a:extLst>
           </p:cNvPr>
@@ -6386,7 +6809,7 @@
           <p:cNvPr id="6" name="Slide Number Placeholder 5">
             <a:extLst>
               <a:ext uri="{FF2B5EF4-FFF2-40B4-BE49-F238E27FC236}">
-                <a16:creationId xmlns:a16="http://schemas.microsoft.com/office/drawing/2014/main" id="{7906504C-8276-25B6-45D2-1F9EE4F3F44E}"/>
+                <a16:creationId xmlns:a16="http://schemas.microsoft.com/office/drawing/2014/main" id="{94ECEA99-35E4-FA1D-1E96-5C5AF35F8001}"/>
               </a:ext>
             </a:extLst>
           </p:cNvPr>
@@ -6405,183 +6828,6 @@
             <a:fld id="{196A61CA-0502-4EE4-9724-96EA822543E5}" type="slidenum">
               <a:rPr lang="en-US" dirty="0"/>
               <a:t>16</a:t>
-            </a:fld>
-            <a:endParaRPr lang="en-US" dirty="0"/>
-          </a:p>
-        </p:txBody>
-      </p:sp>
-    </p:spTree>
-    <p:extLst>
-      <p:ext uri="{BB962C8B-B14F-4D97-AF65-F5344CB8AC3E}">
-        <p14:creationId xmlns:p14="http://schemas.microsoft.com/office/powerpoint/2010/main" val="2219411030"/>
-      </p:ext>
-    </p:extLst>
-  </p:cSld>
-  <p:clrMapOvr>
-    <a:masterClrMapping/>
-  </p:clrMapOvr>
-</p:sld>
-</file>
-
-<file path=ppt/slides/slide17.xml><?xml version="1.0" encoding="utf-8"?>
-<p:sld xmlns:a="http://schemas.openxmlformats.org/drawingml/2006/main" xmlns:r="http://schemas.openxmlformats.org/officeDocument/2006/relationships" xmlns:p="http://schemas.openxmlformats.org/presentationml/2006/main">
-  <p:cSld>
-    <p:spTree>
-      <p:nvGrpSpPr>
-        <p:cNvPr id="1" name=""/>
-        <p:cNvGrpSpPr/>
-        <p:nvPr/>
-      </p:nvGrpSpPr>
-      <p:grpSpPr>
-        <a:xfrm>
-          <a:off x="0" y="0"/>
-          <a:ext cx="0" cy="0"/>
-          <a:chOff x="0" y="0"/>
-          <a:chExt cx="0" cy="0"/>
-        </a:xfrm>
-      </p:grpSpPr>
-      <p:sp>
-        <p:nvSpPr>
-          <p:cNvPr id="2" name="Title 1">
-            <a:extLst>
-              <a:ext uri="{FF2B5EF4-FFF2-40B4-BE49-F238E27FC236}">
-                <a16:creationId xmlns:a16="http://schemas.microsoft.com/office/drawing/2014/main" id="{803FC071-7465-3F1F-5475-28D9D7F7957F}"/>
-              </a:ext>
-            </a:extLst>
-          </p:cNvPr>
-          <p:cNvSpPr>
-            <a:spLocks noGrp="1"/>
-          </p:cNvSpPr>
-          <p:nvPr>
-            <p:ph type="title"/>
-          </p:nvPr>
-        </p:nvSpPr>
-        <p:spPr/>
-        <p:txBody>
-          <a:bodyPr/>
-          <a:lstStyle/>
-          <a:p>
-            <a:r>
-              <a:rPr lang="en-US" dirty="0"/>
-              <a:t>Description of proposed solution</a:t>
-            </a:r>
-          </a:p>
-        </p:txBody>
-      </p:sp>
-      <p:sp>
-        <p:nvSpPr>
-          <p:cNvPr id="3" name="Content Placeholder 2">
-            <a:extLst>
-              <a:ext uri="{FF2B5EF4-FFF2-40B4-BE49-F238E27FC236}">
-                <a16:creationId xmlns:a16="http://schemas.microsoft.com/office/drawing/2014/main" id="{896A4DE5-CABE-8B5D-527B-10EFA48C8983}"/>
-              </a:ext>
-            </a:extLst>
-          </p:cNvPr>
-          <p:cNvSpPr>
-            <a:spLocks noGrp="1"/>
-          </p:cNvSpPr>
-          <p:nvPr>
-            <p:ph idx="1"/>
-          </p:nvPr>
-        </p:nvSpPr>
-        <p:spPr/>
-        <p:txBody>
-          <a:bodyPr vert="horz" lIns="91440" tIns="45720" rIns="91440" bIns="45720" rtlCol="0" anchor="t">
-            <a:normAutofit/>
-          </a:bodyPr>
-          <a:lstStyle/>
-          <a:p>
-            <a:r>
-              <a:rPr lang="en-US" dirty="0"/>
-              <a:t>Give an overview of what you solution will be</a:t>
-            </a:r>
-          </a:p>
-          <a:p>
-            <a:endParaRPr lang="en-US" dirty="0"/>
-          </a:p>
-        </p:txBody>
-      </p:sp>
-      <p:sp>
-        <p:nvSpPr>
-          <p:cNvPr id="4" name="Date Placeholder 3">
-            <a:extLst>
-              <a:ext uri="{FF2B5EF4-FFF2-40B4-BE49-F238E27FC236}">
-                <a16:creationId xmlns:a16="http://schemas.microsoft.com/office/drawing/2014/main" id="{49DFB37A-EF32-B985-08FF-60A8C5899542}"/>
-              </a:ext>
-            </a:extLst>
-          </p:cNvPr>
-          <p:cNvSpPr>
-            <a:spLocks noGrp="1"/>
-          </p:cNvSpPr>
-          <p:nvPr>
-            <p:ph type="dt" sz="half" idx="10"/>
-          </p:nvPr>
-        </p:nvSpPr>
-        <p:spPr/>
-        <p:txBody>
-          <a:bodyPr/>
-          <a:lstStyle/>
-          <a:p>
-            <a:fld id="{CC16F647-6B65-48C2-BBB4-4C0D6F485AA1}" type="datetime1">
-              <a:t>12/18/2024</a:t>
-            </a:fld>
-            <a:endParaRPr lang="en-US" dirty="0"/>
-          </a:p>
-        </p:txBody>
-      </p:sp>
-      <p:sp>
-        <p:nvSpPr>
-          <p:cNvPr id="5" name="Footer Placeholder 4">
-            <a:extLst>
-              <a:ext uri="{FF2B5EF4-FFF2-40B4-BE49-F238E27FC236}">
-                <a16:creationId xmlns:a16="http://schemas.microsoft.com/office/drawing/2014/main" id="{A2F86552-D72B-B04C-9F52-6421A6242095}"/>
-              </a:ext>
-            </a:extLst>
-          </p:cNvPr>
-          <p:cNvSpPr>
-            <a:spLocks noGrp="1"/>
-          </p:cNvSpPr>
-          <p:nvPr>
-            <p:ph type="ftr" sz="quarter" idx="11"/>
-          </p:nvPr>
-        </p:nvSpPr>
-        <p:spPr/>
-        <p:txBody>
-          <a:bodyPr/>
-          <a:lstStyle/>
-          <a:p>
-            <a:r>
-              <a:rPr lang="en-US" dirty="0"/>
-              <a:t>
-              </a:t>
-            </a:r>
-          </a:p>
-        </p:txBody>
-      </p:sp>
-      <p:sp>
-        <p:nvSpPr>
-          <p:cNvPr id="6" name="Slide Number Placeholder 5">
-            <a:extLst>
-              <a:ext uri="{FF2B5EF4-FFF2-40B4-BE49-F238E27FC236}">
-                <a16:creationId xmlns:a16="http://schemas.microsoft.com/office/drawing/2014/main" id="{94ECEA99-35E4-FA1D-1E96-5C5AF35F8001}"/>
-              </a:ext>
-            </a:extLst>
-          </p:cNvPr>
-          <p:cNvSpPr>
-            <a:spLocks noGrp="1"/>
-          </p:cNvSpPr>
-          <p:nvPr>
-            <p:ph type="sldNum" sz="quarter" idx="12"/>
-          </p:nvPr>
-        </p:nvSpPr>
-        <p:spPr/>
-        <p:txBody>
-          <a:bodyPr/>
-          <a:lstStyle/>
-          <a:p>
-            <a:fld id="{196A61CA-0502-4EE4-9724-96EA822543E5}" type="slidenum">
-              <a:rPr lang="en-US" dirty="0"/>
-              <a:t>17</a:t>
             </a:fld>
             <a:endParaRPr lang="en-US" dirty="0"/>
           </a:p>
@@ -6630,7 +6876,7 @@
 </p:sld>
 </file>
 
-<file path=ppt/slides/slide18.xml><?xml version="1.0" encoding="utf-8"?>
+<file path=ppt/slides/slide17.xml><?xml version="1.0" encoding="utf-8"?>
 <p:sld xmlns:a="http://schemas.openxmlformats.org/drawingml/2006/main" xmlns:r="http://schemas.openxmlformats.org/officeDocument/2006/relationships" xmlns:p="http://schemas.openxmlformats.org/presentationml/2006/main">
   <p:cSld>
     <p:spTree>
@@ -6756,7 +7002,8 @@
           <a:lstStyle/>
           <a:p>
             <a:fld id="{BE83C353-B6F6-473E-A695-BC11C4E9421B}" type="datetime1">
-              <a:t>12/18/2024</a:t>
+              <a:rPr lang="en-US"/>
+              <a:t>3/6/2025</a:t>
             </a:fld>
             <a:endParaRPr lang="en-US" dirty="0"/>
           </a:p>
@@ -6814,7 +7061,7 @@
           <a:p>
             <a:fld id="{196A61CA-0502-4EE4-9724-96EA822543E5}" type="slidenum">
               <a:rPr lang="en-US" dirty="0"/>
-              <a:t>18</a:t>
+              <a:t>17</a:t>
             </a:fld>
             <a:endParaRPr lang="en-US" dirty="0"/>
           </a:p>
@@ -6943,7 +7190,7 @@
           <a:lstStyle/>
           <a:p>
             <a:fld id="{8EBE4D92-18CE-48AA-90BC-66EA782D8077}" type="datetime1">
-              <a:t>12/18/2024</a:t>
+              <a:t>3/6/2025</a:t>
             </a:fld>
             <a:endParaRPr lang="en-US" dirty="0"/>
           </a:p>
@@ -7126,7 +7373,7 @@
           <a:lstStyle/>
           <a:p>
             <a:fld id="{88998497-DF50-4F3F-826A-95DAC58057B5}" type="datetime1">
-              <a:t>12/18/2024</a:t>
+              <a:t>3/6/2025</a:t>
             </a:fld>
             <a:endParaRPr lang="en-US" dirty="0"/>
           </a:p>
@@ -7309,7 +7556,7 @@
           <a:lstStyle/>
           <a:p>
             <a:fld id="{1CC88A7A-2E69-4533-9D0F-CEBAD7B8520B}" type="datetime1">
-              <a:t>12/18/2024</a:t>
+              <a:t>3/6/2025</a:t>
             </a:fld>
             <a:endParaRPr lang="en-US" dirty="0"/>
           </a:p>
@@ -7511,7 +7758,7 @@
           <a:lstStyle/>
           <a:p>
             <a:fld id="{F81C30CD-7F7B-41E7-B85B-EFC5E14000EA}" type="datetime1">
-              <a:t>12/18/2024</a:t>
+              <a:t>3/6/2025</a:t>
             </a:fld>
             <a:endParaRPr lang="en-US" dirty="0"/>
           </a:p>
@@ -7710,7 +7957,7 @@
           <a:lstStyle/>
           <a:p>
             <a:fld id="{75F3553C-6161-4CE7-89C8-56D68CCC5D35}" type="datetime1">
-              <a:t>12/18/2024</a:t>
+              <a:t>3/6/2025</a:t>
             </a:fld>
             <a:endParaRPr lang="en-US" dirty="0"/>
           </a:p>
@@ -7896,7 +8143,7 @@
           <a:lstStyle/>
           <a:p>
             <a:fld id="{6B3141A6-299E-41B5-BFB6-FA5A883622E2}" type="datetime1">
-              <a:t>12/18/2024</a:t>
+              <a:t>3/6/2025</a:t>
             </a:fld>
             <a:endParaRPr lang="en-US" dirty="0"/>
           </a:p>
@@ -8130,7 +8377,7 @@
           <a:lstStyle/>
           <a:p>
             <a:fld id="{7E522A4D-AA11-4D4D-969D-E8401E9ED909}" type="datetime1">
-              <a:t>12/18/2024</a:t>
+              <a:t>3/6/2025</a:t>
             </a:fld>
             <a:endParaRPr lang="en-US" dirty="0"/>
           </a:p>
@@ -8395,7 +8642,8 @@
           <a:lstStyle/>
           <a:p>
             <a:fld id="{D15F140F-917F-45AD-8641-B2BBDED881BB}" type="datetime1">
-              <a:t>12/18/2024</a:t>
+              <a:rPr lang="en-US"/>
+              <a:t>3/6/2025</a:t>
             </a:fld>
             <a:endParaRPr lang="en-US" dirty="0"/>
           </a:p>
@@ -8703,48 +8951,322 @@
 </a:theme>
 </file>
 
-<file path=customXml/item1.xml><?xml version="1.0" encoding="utf-8"?>
-<p:properties xmlns:p="http://schemas.microsoft.com/office/2006/metadata/properties" xmlns:xsi="http://www.w3.org/2001/XMLSchema-instance" xmlns:pc="http://schemas.microsoft.com/office/infopath/2007/PartnerControls">
-  <documentManagement>
-    <CurriculumSubject xmlns="a04d4b19-f621-4c3c-bc2e-e56ad8b8266c">T-level Digital</CurriculumSubject>
-    <a90ffa40902743bb99d67678a74fff05 xmlns="a04d4b19-f621-4c3c-bc2e-e56ad8b8266c">
-      <Terms xmlns="http://schemas.microsoft.com/office/infopath/2007/PartnerControls"/>
-    </a90ffa40902743bb99d67678a74fff05>
-    <nb57963f19db43999fe03d95719ba5d2 xmlns="a04d4b19-f621-4c3c-bc2e-e56ad8b8266c">
-      <Terms xmlns="http://schemas.microsoft.com/office/infopath/2007/PartnerControls"/>
-    </nb57963f19db43999fe03d95719ba5d2>
-    <Year xmlns="a04d4b19-f621-4c3c-bc2e-e56ad8b8266c" xsi:nil="true"/>
-    <KeyStage xmlns="a04d4b19-f621-4c3c-bc2e-e56ad8b8266c" xsi:nil="true"/>
-    <PersonalIdentificationData xmlns="a04d4b19-f621-4c3c-bc2e-e56ad8b8266c" xsi:nil="true"/>
-    <TaxCatchAll xmlns="a04d4b19-f621-4c3c-bc2e-e56ad8b8266c" xsi:nil="true"/>
-    <k3d49de15793479bb679f9814d141fa3 xmlns="a04d4b19-f621-4c3c-bc2e-e56ad8b8266c">
-      <Terms xmlns="http://schemas.microsoft.com/office/infopath/2007/PartnerControls"/>
-    </k3d49de15793479bb679f9814d141fa3>
-    <lcf76f155ced4ddcb4097134ff3c332f xmlns="cd186e81-9251-4aad-9103-4c6d14f9fcfa">
-      <Terms xmlns="http://schemas.microsoft.com/office/infopath/2007/PartnerControls"/>
-    </lcf76f155ced4ddcb4097134ff3c332f>
-    <Lesson xmlns="a04d4b19-f621-4c3c-bc2e-e56ad8b8266c" xsi:nil="true"/>
-    <CustomTags xmlns="a04d4b19-f621-4c3c-bc2e-e56ad8b8266c" xsi:nil="true"/>
-    <mcb57dbb60604ce6a1cb56bc7737ae97 xmlns="a04d4b19-f621-4c3c-bc2e-e56ad8b8266c">
-      <Terms xmlns="http://schemas.microsoft.com/office/infopath/2007/PartnerControls"/>
-    </mcb57dbb60604ce6a1cb56bc7737ae97>
-    <b3f45adbdd2a47258628f32c9c148486 xmlns="a04d4b19-f621-4c3c-bc2e-e56ad8b8266c">
-      <Terms xmlns="http://schemas.microsoft.com/office/infopath/2007/PartnerControls"/>
-    </b3f45adbdd2a47258628f32c9c148486>
-  </documentManagement>
-</p:properties>
+<file path=ppt/theme/theme2.xml><?xml version="1.0" encoding="utf-8"?>
+<a:theme xmlns:a="http://schemas.openxmlformats.org/drawingml/2006/main" name="Office Theme">
+  <a:themeElements>
+    <a:clrScheme name="Office">
+      <a:dk1>
+        <a:sysClr val="windowText" lastClr="000000"/>
+      </a:dk1>
+      <a:lt1>
+        <a:sysClr val="window" lastClr="FFFFFF"/>
+      </a:lt1>
+      <a:dk2>
+        <a:srgbClr val="0E2841"/>
+      </a:dk2>
+      <a:lt2>
+        <a:srgbClr val="E8E8E8"/>
+      </a:lt2>
+      <a:accent1>
+        <a:srgbClr val="156082"/>
+      </a:accent1>
+      <a:accent2>
+        <a:srgbClr val="E97132"/>
+      </a:accent2>
+      <a:accent3>
+        <a:srgbClr val="196B24"/>
+      </a:accent3>
+      <a:accent4>
+        <a:srgbClr val="0F9ED5"/>
+      </a:accent4>
+      <a:accent5>
+        <a:srgbClr val="A02B93"/>
+      </a:accent5>
+      <a:accent6>
+        <a:srgbClr val="4EA72E"/>
+      </a:accent6>
+      <a:hlink>
+        <a:srgbClr val="467886"/>
+      </a:hlink>
+      <a:folHlink>
+        <a:srgbClr val="96607D"/>
+      </a:folHlink>
+    </a:clrScheme>
+    <a:fontScheme name="Office">
+      <a:majorFont>
+        <a:latin typeface="Aptos Display" panose="02110004020202020204"/>
+        <a:ea typeface=""/>
+        <a:cs typeface=""/>
+        <a:font script="Jpan" typeface="游ゴシック Light"/>
+        <a:font script="Hang" typeface="맑은 고딕"/>
+        <a:font script="Hans" typeface="等线 Light"/>
+        <a:font script="Hant" typeface="新細明體"/>
+        <a:font script="Arab" typeface="Times New Roman"/>
+        <a:font script="Hebr" typeface="Times New Roman"/>
+        <a:font script="Thai" typeface="Angsana New"/>
+        <a:font script="Ethi" typeface="Nyala"/>
+        <a:font script="Beng" typeface="Vrinda"/>
+        <a:font script="Gujr" typeface="Shruti"/>
+        <a:font script="Khmr" typeface="MoolBoran"/>
+        <a:font script="Knda" typeface="Tunga"/>
+        <a:font script="Guru" typeface="Raavi"/>
+        <a:font script="Cans" typeface="Euphemia"/>
+        <a:font script="Cher" typeface="Plantagenet Cherokee"/>
+        <a:font script="Yiii" typeface="Microsoft Yi Baiti"/>
+        <a:font script="Tibt" typeface="Microsoft Himalaya"/>
+        <a:font script="Thaa" typeface="MV Boli"/>
+        <a:font script="Deva" typeface="Mangal"/>
+        <a:font script="Telu" typeface="Gautami"/>
+        <a:font script="Taml" typeface="Latha"/>
+        <a:font script="Syrc" typeface="Estrangelo Edessa"/>
+        <a:font script="Orya" typeface="Kalinga"/>
+        <a:font script="Mlym" typeface="Kartika"/>
+        <a:font script="Laoo" typeface="DokChampa"/>
+        <a:font script="Sinh" typeface="Iskoola Pota"/>
+        <a:font script="Mong" typeface="Mongolian Baiti"/>
+        <a:font script="Viet" typeface="Times New Roman"/>
+        <a:font script="Uigh" typeface="Microsoft Uighur"/>
+        <a:font script="Geor" typeface="Sylfaen"/>
+        <a:font script="Armn" typeface="Arial"/>
+        <a:font script="Bugi" typeface="Leelawadee UI"/>
+        <a:font script="Bopo" typeface="Microsoft JhengHei"/>
+        <a:font script="Java" typeface="Javanese Text"/>
+        <a:font script="Lisu" typeface="Segoe UI"/>
+        <a:font script="Mymr" typeface="Myanmar Text"/>
+        <a:font script="Nkoo" typeface="Ebrima"/>
+        <a:font script="Olck" typeface="Nirmala UI"/>
+        <a:font script="Osma" typeface="Ebrima"/>
+        <a:font script="Phag" typeface="Phagspa"/>
+        <a:font script="Syrn" typeface="Estrangelo Edessa"/>
+        <a:font script="Syrj" typeface="Estrangelo Edessa"/>
+        <a:font script="Syre" typeface="Estrangelo Edessa"/>
+        <a:font script="Sora" typeface="Nirmala UI"/>
+        <a:font script="Tale" typeface="Microsoft Tai Le"/>
+        <a:font script="Talu" typeface="Microsoft New Tai Lue"/>
+        <a:font script="Tfng" typeface="Ebrima"/>
+      </a:majorFont>
+      <a:minorFont>
+        <a:latin typeface="Aptos" panose="02110004020202020204"/>
+        <a:ea typeface=""/>
+        <a:cs typeface=""/>
+        <a:font script="Jpan" typeface="游ゴシック"/>
+        <a:font script="Hang" typeface="맑은 고딕"/>
+        <a:font script="Hans" typeface="等线"/>
+        <a:font script="Hant" typeface="新細明體"/>
+        <a:font script="Arab" typeface="Arial"/>
+        <a:font script="Hebr" typeface="Arial"/>
+        <a:font script="Thai" typeface="Cordia New"/>
+        <a:font script="Ethi" typeface="Nyala"/>
+        <a:font script="Beng" typeface="Vrinda"/>
+        <a:font script="Gujr" typeface="Shruti"/>
+        <a:font script="Khmr" typeface="DaunPenh"/>
+        <a:font script="Knda" typeface="Tunga"/>
+        <a:font script="Guru" typeface="Raavi"/>
+        <a:font script="Cans" typeface="Euphemia"/>
+        <a:font script="Cher" typeface="Plantagenet Cherokee"/>
+        <a:font script="Yiii" typeface="Microsoft Yi Baiti"/>
+        <a:font script="Tibt" typeface="Microsoft Himalaya"/>
+        <a:font script="Thaa" typeface="MV Boli"/>
+        <a:font script="Deva" typeface="Mangal"/>
+        <a:font script="Telu" typeface="Gautami"/>
+        <a:font script="Taml" typeface="Latha"/>
+        <a:font script="Syrc" typeface="Estrangelo Edessa"/>
+        <a:font script="Orya" typeface="Kalinga"/>
+        <a:font script="Mlym" typeface="Kartika"/>
+        <a:font script="Laoo" typeface="DokChampa"/>
+        <a:font script="Sinh" typeface="Iskoola Pota"/>
+        <a:font script="Mong" typeface="Mongolian Baiti"/>
+        <a:font script="Viet" typeface="Arial"/>
+        <a:font script="Uigh" typeface="Microsoft Uighur"/>
+        <a:font script="Geor" typeface="Sylfaen"/>
+        <a:font script="Armn" typeface="Arial"/>
+        <a:font script="Bugi" typeface="Leelawadee UI"/>
+        <a:font script="Bopo" typeface="Microsoft JhengHei"/>
+        <a:font script="Java" typeface="Javanese Text"/>
+        <a:font script="Lisu" typeface="Segoe UI"/>
+        <a:font script="Mymr" typeface="Myanmar Text"/>
+        <a:font script="Nkoo" typeface="Ebrima"/>
+        <a:font script="Olck" typeface="Nirmala UI"/>
+        <a:font script="Osma" typeface="Ebrima"/>
+        <a:font script="Phag" typeface="Phagspa"/>
+        <a:font script="Syrn" typeface="Estrangelo Edessa"/>
+        <a:font script="Syrj" typeface="Estrangelo Edessa"/>
+        <a:font script="Syre" typeface="Estrangelo Edessa"/>
+        <a:font script="Sora" typeface="Nirmala UI"/>
+        <a:font script="Tale" typeface="Microsoft Tai Le"/>
+        <a:font script="Talu" typeface="Microsoft New Tai Lue"/>
+        <a:font script="Tfng" typeface="Ebrima"/>
+      </a:minorFont>
+    </a:fontScheme>
+    <a:fmtScheme name="Office">
+      <a:fillStyleLst>
+        <a:solidFill>
+          <a:schemeClr val="phClr"/>
+        </a:solidFill>
+        <a:gradFill rotWithShape="1">
+          <a:gsLst>
+            <a:gs pos="0">
+              <a:schemeClr val="phClr">
+                <a:lumMod val="110000"/>
+                <a:satMod val="105000"/>
+                <a:tint val="67000"/>
+              </a:schemeClr>
+            </a:gs>
+            <a:gs pos="50000">
+              <a:schemeClr val="phClr">
+                <a:lumMod val="105000"/>
+                <a:satMod val="103000"/>
+                <a:tint val="73000"/>
+              </a:schemeClr>
+            </a:gs>
+            <a:gs pos="100000">
+              <a:schemeClr val="phClr">
+                <a:lumMod val="105000"/>
+                <a:satMod val="109000"/>
+                <a:tint val="81000"/>
+              </a:schemeClr>
+            </a:gs>
+          </a:gsLst>
+          <a:lin ang="5400000" scaled="0"/>
+        </a:gradFill>
+        <a:gradFill rotWithShape="1">
+          <a:gsLst>
+            <a:gs pos="0">
+              <a:schemeClr val="phClr">
+                <a:satMod val="103000"/>
+                <a:lumMod val="102000"/>
+                <a:tint val="94000"/>
+              </a:schemeClr>
+            </a:gs>
+            <a:gs pos="50000">
+              <a:schemeClr val="phClr">
+                <a:satMod val="110000"/>
+                <a:lumMod val="100000"/>
+                <a:shade val="100000"/>
+              </a:schemeClr>
+            </a:gs>
+            <a:gs pos="100000">
+              <a:schemeClr val="phClr">
+                <a:lumMod val="99000"/>
+                <a:satMod val="120000"/>
+                <a:shade val="78000"/>
+              </a:schemeClr>
+            </a:gs>
+          </a:gsLst>
+          <a:lin ang="5400000" scaled="0"/>
+        </a:gradFill>
+      </a:fillStyleLst>
+      <a:lnStyleLst>
+        <a:ln w="12700" cap="flat" cmpd="sng" algn="ctr">
+          <a:solidFill>
+            <a:schemeClr val="phClr"/>
+          </a:solidFill>
+          <a:prstDash val="solid"/>
+          <a:miter lim="800000"/>
+        </a:ln>
+        <a:ln w="19050" cap="flat" cmpd="sng" algn="ctr">
+          <a:solidFill>
+            <a:schemeClr val="phClr"/>
+          </a:solidFill>
+          <a:prstDash val="solid"/>
+          <a:miter lim="800000"/>
+        </a:ln>
+        <a:ln w="25400" cap="flat" cmpd="sng" algn="ctr">
+          <a:solidFill>
+            <a:schemeClr val="phClr"/>
+          </a:solidFill>
+          <a:prstDash val="solid"/>
+          <a:miter lim="800000"/>
+        </a:ln>
+      </a:lnStyleLst>
+      <a:effectStyleLst>
+        <a:effectStyle>
+          <a:effectLst/>
+        </a:effectStyle>
+        <a:effectStyle>
+          <a:effectLst/>
+        </a:effectStyle>
+        <a:effectStyle>
+          <a:effectLst>
+            <a:outerShdw blurRad="57150" dist="19050" dir="5400000" algn="ctr" rotWithShape="0">
+              <a:srgbClr val="000000">
+                <a:alpha val="63000"/>
+              </a:srgbClr>
+            </a:outerShdw>
+          </a:effectLst>
+        </a:effectStyle>
+      </a:effectStyleLst>
+      <a:bgFillStyleLst>
+        <a:solidFill>
+          <a:schemeClr val="phClr"/>
+        </a:solidFill>
+        <a:solidFill>
+          <a:schemeClr val="phClr">
+            <a:tint val="95000"/>
+            <a:satMod val="170000"/>
+          </a:schemeClr>
+        </a:solidFill>
+        <a:gradFill rotWithShape="1">
+          <a:gsLst>
+            <a:gs pos="0">
+              <a:schemeClr val="phClr">
+                <a:tint val="93000"/>
+                <a:satMod val="150000"/>
+                <a:shade val="98000"/>
+                <a:lumMod val="102000"/>
+              </a:schemeClr>
+            </a:gs>
+            <a:gs pos="50000">
+              <a:schemeClr val="phClr">
+                <a:tint val="98000"/>
+                <a:satMod val="130000"/>
+                <a:shade val="90000"/>
+                <a:lumMod val="103000"/>
+              </a:schemeClr>
+            </a:gs>
+            <a:gs pos="100000">
+              <a:schemeClr val="phClr">
+                <a:shade val="63000"/>
+                <a:satMod val="120000"/>
+              </a:schemeClr>
+            </a:gs>
+          </a:gsLst>
+          <a:lin ang="5400000" scaled="0"/>
+        </a:gradFill>
+      </a:bgFillStyleLst>
+    </a:fmtScheme>
+  </a:themeElements>
+  <a:objectDefaults>
+    <a:lnDef>
+      <a:spPr/>
+      <a:bodyPr/>
+      <a:lstStyle/>
+      <a:style>
+        <a:lnRef idx="2">
+          <a:schemeClr val="accent1"/>
+        </a:lnRef>
+        <a:fillRef idx="0">
+          <a:schemeClr val="accent1"/>
+        </a:fillRef>
+        <a:effectRef idx="1">
+          <a:schemeClr val="accent1"/>
+        </a:effectRef>
+        <a:fontRef idx="minor">
+          <a:schemeClr val="tx1"/>
+        </a:fontRef>
+      </a:style>
+    </a:lnDef>
+  </a:objectDefaults>
+  <a:extraClrSchemeLst/>
+  <a:extLst>
+    <a:ext uri="{05A4C25C-085E-4340-85A3-A5531E510DB2}">
+      <thm15:themeFamily xmlns:thm15="http://schemas.microsoft.com/office/thememl/2012/main" name="Office Theme" id="{2E142A2C-CD16-42D6-873A-C26D2A0506FA}" vid="{1BDDFF52-6CD6-40A5-AB3C-68EB2F1E4D0A}"/>
+    </a:ext>
+  </a:extLst>
+</a:theme>
 </file>
 
-<file path=customXml/item2.xml><?xml version="1.0" encoding="utf-8"?>
-<?mso-contentType ?>
-<FormTemplates xmlns="http://schemas.microsoft.com/sharepoint/v3/contenttype/forms">
-  <Display>DocumentLibraryForm</Display>
-  <Edit>DocumentLibraryForm</Edit>
-  <New>DocumentLibraryForm</New>
-</FormTemplates>
-</file>
-
-<file path=customXml/item3.xml><?xml version="1.0" encoding="utf-8"?>
+<file path=customXml/item1.xml><?xml version="1.0" encoding="utf-8"?>
 <ct:contentTypeSchema xmlns:ct="http://schemas.microsoft.com/office/2006/metadata/contentType" xmlns:ma="http://schemas.microsoft.com/office/2006/metadata/properties/metaAttributes" ct:_="" ma:_="" ma:contentTypeName="Document" ma:contentTypeID="0x0101008387A0779FAD544C9159E1CE3C4D4EBA" ma:contentTypeVersion="27" ma:contentTypeDescription="Create a new document." ma:contentTypeScope="" ma:versionID="d3a5c276afde6802ecfa4a38c63a3a13">
   <xsd:schema xmlns:xsd="http://www.w3.org/2001/XMLSchema" xmlns:xs="http://www.w3.org/2001/XMLSchema" xmlns:p="http://schemas.microsoft.com/office/2006/metadata/properties" xmlns:ns2="a04d4b19-f621-4c3c-bc2e-e56ad8b8266c" xmlns:ns3="cd186e81-9251-4aad-9103-4c6d14f9fcfa" targetNamespace="http://schemas.microsoft.com/office/2006/metadata/properties" ma:root="true" ma:fieldsID="5f597e0cd352366ea2aa59e07ed3e7bb" ns2:_="" ns3:_="">
     <xsd:import namespace="a04d4b19-f621-4c3c-bc2e-e56ad8b8266c"/>
@@ -9018,26 +9540,48 @@
 </ct:contentTypeSchema>
 </file>
 
-<file path=customXml/itemProps1.xml><?xml version="1.0" encoding="utf-8"?>
-<ds:datastoreItem xmlns:ds="http://schemas.openxmlformats.org/officeDocument/2006/customXml" ds:itemID="{F92C4B1D-1DFA-47C9-AAA4-ABD046394CF1}">
-  <ds:schemaRefs>
-    <ds:schemaRef ds:uri="http://schemas.microsoft.com/office/2006/metadata/properties"/>
-    <ds:schemaRef ds:uri="http://schemas.microsoft.com/office/infopath/2007/PartnerControls"/>
-    <ds:schemaRef ds:uri="a04d4b19-f621-4c3c-bc2e-e56ad8b8266c"/>
-    <ds:schemaRef ds:uri="cd186e81-9251-4aad-9103-4c6d14f9fcfa"/>
-  </ds:schemaRefs>
-</ds:datastoreItem>
+<file path=customXml/item2.xml><?xml version="1.0" encoding="utf-8"?>
+<?mso-contentType ?>
+<FormTemplates xmlns="http://schemas.microsoft.com/sharepoint/v3/contenttype/forms">
+  <Display>DocumentLibraryForm</Display>
+  <Edit>DocumentLibraryForm</Edit>
+  <New>DocumentLibraryForm</New>
+</FormTemplates>
 </file>
 
-<file path=customXml/itemProps2.xml><?xml version="1.0" encoding="utf-8"?>
-<ds:datastoreItem xmlns:ds="http://schemas.openxmlformats.org/officeDocument/2006/customXml" ds:itemID="{0C008F67-1E77-4F1F-B4C7-F9AB5AF1C6D3}">
-  <ds:schemaRefs>
-    <ds:schemaRef ds:uri="http://schemas.microsoft.com/sharepoint/v3/contenttype/forms"/>
-  </ds:schemaRefs>
-</ds:datastoreItem>
+<file path=customXml/item3.xml><?xml version="1.0" encoding="utf-8"?>
+<p:properties xmlns:p="http://schemas.microsoft.com/office/2006/metadata/properties" xmlns:xsi="http://www.w3.org/2001/XMLSchema-instance" xmlns:pc="http://schemas.microsoft.com/office/infopath/2007/PartnerControls">
+  <documentManagement>
+    <CurriculumSubject xmlns="a04d4b19-f621-4c3c-bc2e-e56ad8b8266c">T-level Digital</CurriculumSubject>
+    <a90ffa40902743bb99d67678a74fff05 xmlns="a04d4b19-f621-4c3c-bc2e-e56ad8b8266c">
+      <Terms xmlns="http://schemas.microsoft.com/office/infopath/2007/PartnerControls"/>
+    </a90ffa40902743bb99d67678a74fff05>
+    <nb57963f19db43999fe03d95719ba5d2 xmlns="a04d4b19-f621-4c3c-bc2e-e56ad8b8266c">
+      <Terms xmlns="http://schemas.microsoft.com/office/infopath/2007/PartnerControls"/>
+    </nb57963f19db43999fe03d95719ba5d2>
+    <Year xmlns="a04d4b19-f621-4c3c-bc2e-e56ad8b8266c" xsi:nil="true"/>
+    <KeyStage xmlns="a04d4b19-f621-4c3c-bc2e-e56ad8b8266c" xsi:nil="true"/>
+    <PersonalIdentificationData xmlns="a04d4b19-f621-4c3c-bc2e-e56ad8b8266c" xsi:nil="true"/>
+    <TaxCatchAll xmlns="a04d4b19-f621-4c3c-bc2e-e56ad8b8266c" xsi:nil="true"/>
+    <k3d49de15793479bb679f9814d141fa3 xmlns="a04d4b19-f621-4c3c-bc2e-e56ad8b8266c">
+      <Terms xmlns="http://schemas.microsoft.com/office/infopath/2007/PartnerControls"/>
+    </k3d49de15793479bb679f9814d141fa3>
+    <lcf76f155ced4ddcb4097134ff3c332f xmlns="cd186e81-9251-4aad-9103-4c6d14f9fcfa">
+      <Terms xmlns="http://schemas.microsoft.com/office/infopath/2007/PartnerControls"/>
+    </lcf76f155ced4ddcb4097134ff3c332f>
+    <Lesson xmlns="a04d4b19-f621-4c3c-bc2e-e56ad8b8266c" xsi:nil="true"/>
+    <CustomTags xmlns="a04d4b19-f621-4c3c-bc2e-e56ad8b8266c" xsi:nil="true"/>
+    <mcb57dbb60604ce6a1cb56bc7737ae97 xmlns="a04d4b19-f621-4c3c-bc2e-e56ad8b8266c">
+      <Terms xmlns="http://schemas.microsoft.com/office/infopath/2007/PartnerControls"/>
+    </mcb57dbb60604ce6a1cb56bc7737ae97>
+    <b3f45adbdd2a47258628f32c9c148486 xmlns="a04d4b19-f621-4c3c-bc2e-e56ad8b8266c">
+      <Terms xmlns="http://schemas.microsoft.com/office/infopath/2007/PartnerControls"/>
+    </b3f45adbdd2a47258628f32c9c148486>
+  </documentManagement>
+</p:properties>
 </file>
 
-<file path=customXml/itemProps3.xml><?xml version="1.0" encoding="utf-8"?>
+<file path=customXml/itemProps1.xml><?xml version="1.0" encoding="utf-8"?>
 <ds:datastoreItem xmlns:ds="http://schemas.openxmlformats.org/officeDocument/2006/customXml" ds:itemID="{D56722C2-C7D4-494E-8D47-DC7E662AEC7B}">
   <ds:schemaRefs>
     <ds:schemaRef ds:uri="http://schemas.microsoft.com/office/2006/metadata/contentType"/>
@@ -9054,4 +9598,23 @@
     <ds:schemaRef ds:uri="http://schemas.microsoft.com/internal/obd"/>
   </ds:schemaRefs>
 </ds:datastoreItem>
+</file>
+
+<file path=customXml/itemProps2.xml><?xml version="1.0" encoding="utf-8"?>
+<ds:datastoreItem xmlns:ds="http://schemas.openxmlformats.org/officeDocument/2006/customXml" ds:itemID="{0C008F67-1E77-4F1F-B4C7-F9AB5AF1C6D3}">
+  <ds:schemaRefs>
+    <ds:schemaRef ds:uri="http://schemas.microsoft.com/sharepoint/v3/contenttype/forms"/>
+  </ds:schemaRefs>
+</ds:datastoreItem>
+</file>
+
+<file path=customXml/itemProps3.xml><?xml version="1.0" encoding="utf-8"?>
+<ds:datastoreItem xmlns:ds="http://schemas.openxmlformats.org/officeDocument/2006/customXml" ds:itemID="{F92C4B1D-1DFA-47C9-AAA4-ABD046394CF1}">
+  <ds:schemaRefs>
+    <ds:schemaRef ds:uri="http://schemas.microsoft.com/office/2006/metadata/properties"/>
+    <ds:schemaRef ds:uri="http://schemas.microsoft.com/office/infopath/2007/PartnerControls"/>
+    <ds:schemaRef ds:uri="a04d4b19-f621-4c3c-bc2e-e56ad8b8266c"/>
+    <ds:schemaRef ds:uri="cd186e81-9251-4aad-9103-4c6d14f9fcfa"/>
+  </ds:schemaRefs>
+</ds:datastoreItem>
 </file>
</xml_diff>